<commit_message>
LaboRatorium :P + Yard +prefaby do tego + ogarnięte particle wszystkich budynków już. Czas na czołg i wyrzutnię rakiet!
</commit_message>
<xml_diff>
--- a/Semi/3. Epilog/Epilog.pptx
+++ b/Semi/3. Epilog/Epilog.pptx
@@ -5,18 +5,14 @@
     <p:sldMasterId id="2147483672" r:id="rId1"/>
   </p:sldMasterIdLst>
   <p:notesMasterIdLst>
-    <p:notesMasterId r:id="rId11"/>
+    <p:notesMasterId r:id="rId7"/>
   </p:notesMasterIdLst>
   <p:sldIdLst>
     <p:sldId id="256" r:id="rId2"/>
     <p:sldId id="267" r:id="rId3"/>
-    <p:sldId id="268" r:id="rId4"/>
-    <p:sldId id="269" r:id="rId5"/>
-    <p:sldId id="271" r:id="rId6"/>
-    <p:sldId id="272" r:id="rId7"/>
-    <p:sldId id="275" r:id="rId8"/>
-    <p:sldId id="257" r:id="rId9"/>
-    <p:sldId id="276" r:id="rId10"/>
+    <p:sldId id="275" r:id="rId4"/>
+    <p:sldId id="257" r:id="rId5"/>
+    <p:sldId id="276" r:id="rId6"/>
   </p:sldIdLst>
   <p:sldSz cx="9144000" cy="6858000" type="screen4x3"/>
   <p:notesSz cx="6858000" cy="9144000"/>
@@ -200,7 +196,7 @@
           <a:p>
             <a:fld id="{4652F068-1F42-46B7-8E03-E3D93974D478}" type="datetimeFigureOut">
               <a:rPr lang="pl-PL" smtClean="0"/>
-              <a:t>2016-06-04</a:t>
+              <a:t>2016-06-06</a:t>
             </a:fld>
             <a:endParaRPr lang="pl-PL"/>
           </a:p>
@@ -627,7 +623,7 @@
           <a:p>
             <a:fld id="{143498DD-2B63-4F10-A61C-73504999BF6F}" type="slidenum">
               <a:rPr lang="pl-PL" smtClean="0"/>
-              <a:t>9</a:t>
+              <a:t>5</a:t>
             </a:fld>
             <a:endParaRPr lang="pl-PL"/>
           </a:p>
@@ -859,7 +855,7 @@
           <a:p>
             <a:fld id="{7682C45A-3345-4199-A11E-F37BA1E473B0}" type="datetimeFigureOut">
               <a:rPr lang="pl-PL" smtClean="0"/>
-              <a:t>2016-06-04</a:t>
+              <a:t>2016-06-06</a:t>
             </a:fld>
             <a:endParaRPr lang="pl-PL"/>
           </a:p>
@@ -1150,7 +1146,7 @@
           <a:p>
             <a:fld id="{7682C45A-3345-4199-A11E-F37BA1E473B0}" type="datetimeFigureOut">
               <a:rPr lang="pl-PL" smtClean="0"/>
-              <a:t>2016-06-04</a:t>
+              <a:t>2016-06-06</a:t>
             </a:fld>
             <a:endParaRPr lang="pl-PL"/>
           </a:p>
@@ -1414,7 +1410,7 @@
           <a:p>
             <a:fld id="{7682C45A-3345-4199-A11E-F37BA1E473B0}" type="datetimeFigureOut">
               <a:rPr lang="pl-PL" smtClean="0"/>
-              <a:t>2016-06-04</a:t>
+              <a:t>2016-06-06</a:t>
             </a:fld>
             <a:endParaRPr lang="pl-PL"/>
           </a:p>
@@ -1974,7 +1970,7 @@
           <a:p>
             <a:fld id="{7682C45A-3345-4199-A11E-F37BA1E473B0}" type="datetimeFigureOut">
               <a:rPr lang="pl-PL" smtClean="0"/>
-              <a:t>2016-06-04</a:t>
+              <a:t>2016-06-06</a:t>
             </a:fld>
             <a:endParaRPr lang="pl-PL"/>
           </a:p>
@@ -2233,7 +2229,7 @@
           <a:p>
             <a:fld id="{7682C45A-3345-4199-A11E-F37BA1E473B0}" type="datetimeFigureOut">
               <a:rPr lang="pl-PL" smtClean="0"/>
-              <a:t>2016-06-04</a:t>
+              <a:t>2016-06-06</a:t>
             </a:fld>
             <a:endParaRPr lang="pl-PL"/>
           </a:p>
@@ -2809,7 +2805,7 @@
           <a:p>
             <a:fld id="{7682C45A-3345-4199-A11E-F37BA1E473B0}" type="datetimeFigureOut">
               <a:rPr lang="pl-PL" smtClean="0"/>
-              <a:t>2016-06-04</a:t>
+              <a:t>2016-06-06</a:t>
             </a:fld>
             <a:endParaRPr lang="pl-PL"/>
           </a:p>
@@ -3141,7 +3137,7 @@
           <a:p>
             <a:fld id="{7682C45A-3345-4199-A11E-F37BA1E473B0}" type="datetimeFigureOut">
               <a:rPr lang="pl-PL" smtClean="0"/>
-              <a:t>2016-06-04</a:t>
+              <a:t>2016-06-06</a:t>
             </a:fld>
             <a:endParaRPr lang="pl-PL"/>
           </a:p>
@@ -3316,7 +3312,7 @@
           <a:p>
             <a:fld id="{7682C45A-3345-4199-A11E-F37BA1E473B0}" type="datetimeFigureOut">
               <a:rPr lang="pl-PL" smtClean="0"/>
-              <a:t>2016-06-04</a:t>
+              <a:t>2016-06-06</a:t>
             </a:fld>
             <a:endParaRPr lang="pl-PL"/>
           </a:p>
@@ -3496,7 +3492,7 @@
           <a:p>
             <a:fld id="{7682C45A-3345-4199-A11E-F37BA1E473B0}" type="datetimeFigureOut">
               <a:rPr lang="pl-PL" smtClean="0"/>
-              <a:t>2016-06-04</a:t>
+              <a:t>2016-06-06</a:t>
             </a:fld>
             <a:endParaRPr lang="pl-PL"/>
           </a:p>
@@ -3666,7 +3662,7 @@
           <a:p>
             <a:fld id="{7682C45A-3345-4199-A11E-F37BA1E473B0}" type="datetimeFigureOut">
               <a:rPr lang="pl-PL" smtClean="0"/>
-              <a:t>2016-06-04</a:t>
+              <a:t>2016-06-06</a:t>
             </a:fld>
             <a:endParaRPr lang="pl-PL"/>
           </a:p>
@@ -3925,7 +3921,7 @@
           <a:p>
             <a:fld id="{7682C45A-3345-4199-A11E-F37BA1E473B0}" type="datetimeFigureOut">
               <a:rPr lang="pl-PL" smtClean="0"/>
-              <a:t>2016-06-04</a:t>
+              <a:t>2016-06-06</a:t>
             </a:fld>
             <a:endParaRPr lang="pl-PL"/>
           </a:p>
@@ -4217,7 +4213,7 @@
           <a:p>
             <a:fld id="{7682C45A-3345-4199-A11E-F37BA1E473B0}" type="datetimeFigureOut">
               <a:rPr lang="pl-PL" smtClean="0"/>
-              <a:t>2016-06-04</a:t>
+              <a:t>2016-06-06</a:t>
             </a:fld>
             <a:endParaRPr lang="pl-PL"/>
           </a:p>
@@ -4647,7 +4643,7 @@
           <a:p>
             <a:fld id="{7682C45A-3345-4199-A11E-F37BA1E473B0}" type="datetimeFigureOut">
               <a:rPr lang="pl-PL" smtClean="0"/>
-              <a:t>2016-06-04</a:t>
+              <a:t>2016-06-06</a:t>
             </a:fld>
             <a:endParaRPr lang="pl-PL"/>
           </a:p>
@@ -4771,7 +4767,7 @@
           <a:p>
             <a:fld id="{7682C45A-3345-4199-A11E-F37BA1E473B0}" type="datetimeFigureOut">
               <a:rPr lang="pl-PL" smtClean="0"/>
-              <a:t>2016-06-04</a:t>
+              <a:t>2016-06-06</a:t>
             </a:fld>
             <a:endParaRPr lang="pl-PL"/>
           </a:p>
@@ -4866,7 +4862,7 @@
           <a:p>
             <a:fld id="{7682C45A-3345-4199-A11E-F37BA1E473B0}" type="datetimeFigureOut">
               <a:rPr lang="pl-PL" smtClean="0"/>
-              <a:t>2016-06-04</a:t>
+              <a:t>2016-06-06</a:t>
             </a:fld>
             <a:endParaRPr lang="pl-PL"/>
           </a:p>
@@ -5149,7 +5145,7 @@
           <a:p>
             <a:fld id="{7682C45A-3345-4199-A11E-F37BA1E473B0}" type="datetimeFigureOut">
               <a:rPr lang="pl-PL" smtClean="0"/>
-              <a:t>2016-06-04</a:t>
+              <a:t>2016-06-06</a:t>
             </a:fld>
             <a:endParaRPr lang="pl-PL"/>
           </a:p>
@@ -5440,7 +5436,7 @@
           <a:p>
             <a:fld id="{7682C45A-3345-4199-A11E-F37BA1E473B0}" type="datetimeFigureOut">
               <a:rPr lang="pl-PL" smtClean="0"/>
-              <a:t>2016-06-04</a:t>
+              <a:t>2016-06-06</a:t>
             </a:fld>
             <a:endParaRPr lang="pl-PL"/>
           </a:p>
@@ -5671,7 +5667,7 @@
           <a:p>
             <a:fld id="{7682C45A-3345-4199-A11E-F37BA1E473B0}" type="datetimeFigureOut">
               <a:rPr lang="pl-PL" smtClean="0"/>
-              <a:t>2016-06-04</a:t>
+              <a:t>2016-06-06</a:t>
             </a:fld>
             <a:endParaRPr lang="pl-PL"/>
           </a:p>
@@ -6820,7 +6816,7 @@
         </p:spPr>
         <p:txBody>
           <a:bodyPr>
-            <a:normAutofit/>
+            <a:normAutofit fontScale="92500" lnSpcReduction="10000"/>
           </a:bodyPr>
           <a:lstStyle/>
           <a:p>
@@ -6829,29 +6825,110 @@
               <a:t>Prototyp gry </a:t>
             </a:r>
             <a:r>
-              <a:rPr lang="pl-PL" sz="2000" dirty="0" smtClean="0"/>
-              <a:t>RTS</a:t>
+              <a:rPr lang="pl-PL" sz="2400" dirty="0" smtClean="0"/>
+              <a:t>RTS oparty o nieskomplikowane reguły</a:t>
+            </a:r>
+            <a:endParaRPr lang="pl-PL" sz="2400" dirty="0" smtClean="0"/>
+          </a:p>
+          <a:p>
+            <a:r>
+              <a:rPr lang="pl-PL" sz="2400" dirty="0" smtClean="0"/>
+              <a:t>Sztuczna </a:t>
+            </a:r>
+            <a:r>
+              <a:rPr lang="pl-PL" sz="2400" dirty="0" smtClean="0"/>
+              <a:t>inteligencja dla </a:t>
+            </a:r>
+            <a:r>
+              <a:rPr lang="pl-PL" sz="2400" dirty="0" smtClean="0"/>
+              <a:t>przeciwnika</a:t>
             </a:r>
           </a:p>
           <a:p>
             <a:pPr lvl="1"/>
             <a:r>
-              <a:rPr lang="pl-PL" sz="2000" dirty="0" smtClean="0"/>
-              <a:t>(Dune 2, Warcraft, Starcraft, Supreme Commander)</a:t>
-            </a:r>
+              <a:rPr lang="pl-PL" sz="2200" dirty="0"/>
+              <a:t>Zachowania ekonomiczne</a:t>
+            </a:r>
+          </a:p>
+          <a:p>
+            <a:pPr lvl="1"/>
+            <a:r>
+              <a:rPr lang="pl-PL" sz="2200" dirty="0"/>
+              <a:t>Zachowania </a:t>
+            </a:r>
+            <a:r>
+              <a:rPr lang="pl-PL" sz="2200" dirty="0" smtClean="0"/>
+              <a:t>taktyczne</a:t>
+            </a:r>
+          </a:p>
+          <a:p>
+            <a:pPr lvl="1"/>
+            <a:r>
+              <a:rPr lang="pl-PL" sz="2200" dirty="0" smtClean="0"/>
+              <a:t>Nieuczące się AI</a:t>
+            </a:r>
+            <a:endParaRPr lang="pl-PL" sz="2000" dirty="0" smtClean="0"/>
           </a:p>
           <a:p>
             <a:r>
               <a:rPr lang="pl-PL" sz="2400" dirty="0" smtClean="0"/>
-              <a:t>Sztuczna inteligencja dla przeciwnika</a:t>
-            </a:r>
-          </a:p>
-          <a:p>
+              <a:t>Testowanie </a:t>
+            </a:r>
             <a:r>
               <a:rPr lang="pl-PL" sz="2400" dirty="0" smtClean="0"/>
-              <a:t>Testowanie skuteczności sztucznej inteligencji</a:t>
+              <a:t>skuteczności sztucznej </a:t>
+            </a:r>
+            <a:r>
+              <a:rPr lang="pl-PL" sz="2400" dirty="0" smtClean="0"/>
+              <a:t>inteligencji</a:t>
+            </a:r>
+          </a:p>
+          <a:p>
+            <a:pPr lvl="1"/>
+            <a:r>
+              <a:rPr lang="pl-PL" sz="2400" dirty="0" smtClean="0"/>
+              <a:t>Ustawienie </a:t>
+            </a:r>
+            <a:r>
+              <a:rPr lang="pl-PL" sz="2400" dirty="0"/>
+              <a:t>różnie </a:t>
+            </a:r>
+            <a:r>
+              <a:rPr lang="pl-PL" sz="2400" dirty="0" smtClean="0"/>
+              <a:t>skonfigurowanych </a:t>
+            </a:r>
+            <a:r>
+              <a:rPr lang="pl-PL" sz="2400" dirty="0"/>
+              <a:t>AI na </a:t>
+            </a:r>
+            <a:r>
+              <a:rPr lang="pl-PL" sz="2400" dirty="0" smtClean="0"/>
+              <a:t>planszy </a:t>
+            </a:r>
+            <a:r>
+              <a:rPr lang="pl-PL" sz="2400" dirty="0"/>
+              <a:t>przeciwko </a:t>
+            </a:r>
+            <a:r>
+              <a:rPr lang="pl-PL" sz="2400" dirty="0" smtClean="0"/>
+              <a:t>sobie</a:t>
+            </a:r>
+          </a:p>
+          <a:p>
+            <a:r>
+              <a:rPr lang="pl-PL" sz="2600" dirty="0"/>
+              <a:t>Wnioski na podstawie obserwacji przebiegu </a:t>
+            </a:r>
+            <a:r>
+              <a:rPr lang="pl-PL" sz="2600" dirty="0" smtClean="0"/>
+              <a:t>rozgrywki</a:t>
             </a:r>
             <a:endParaRPr lang="pl-PL" sz="2400" dirty="0"/>
+          </a:p>
+          <a:p>
+            <a:pPr lvl="1"/>
+            <a:endParaRPr lang="pl-PL" sz="2200" dirty="0"/>
           </a:p>
         </p:txBody>
       </p:sp>
@@ -6894,557 +6971,6 @@
       </p:grpSpPr>
       <p:sp>
         <p:nvSpPr>
-          <p:cNvPr id="2" name="Title 1"/>
-          <p:cNvSpPr>
-            <a:spLocks noGrp="1"/>
-          </p:cNvSpPr>
-          <p:nvPr>
-            <p:ph type="title"/>
-          </p:nvPr>
-        </p:nvSpPr>
-        <p:spPr/>
-        <p:txBody>
-          <a:bodyPr>
-            <a:normAutofit/>
-          </a:bodyPr>
-          <a:lstStyle/>
-          <a:p>
-            <a:r>
-              <a:rPr lang="pl-PL" sz="3600" dirty="0" smtClean="0"/>
-              <a:t>Prototyp gry RTS - założenia	</a:t>
-            </a:r>
-            <a:endParaRPr lang="pl-PL" sz="3600" dirty="0"/>
-          </a:p>
-        </p:txBody>
-      </p:sp>
-      <p:sp>
-        <p:nvSpPr>
-          <p:cNvPr id="3" name="Content Placeholder 2"/>
-          <p:cNvSpPr>
-            <a:spLocks noGrp="1"/>
-          </p:cNvSpPr>
-          <p:nvPr>
-            <p:ph idx="1"/>
-          </p:nvPr>
-        </p:nvSpPr>
-        <p:spPr>
-          <a:xfrm>
-            <a:off x="425417" y="1890756"/>
-            <a:ext cx="8297332" cy="4041162"/>
-          </a:xfrm>
-        </p:spPr>
-        <p:txBody>
-          <a:bodyPr>
-            <a:normAutofit/>
-          </a:bodyPr>
-          <a:lstStyle/>
-          <a:p>
-            <a:r>
-              <a:rPr lang="pl-PL" sz="2400" dirty="0" smtClean="0"/>
-              <a:t>Proste reguły</a:t>
-            </a:r>
-          </a:p>
-          <a:p>
-            <a:r>
-              <a:rPr lang="pl-PL" sz="2400" dirty="0" smtClean="0"/>
-              <a:t>Kilka rodzajów jednostek, kilka rodzajów budynków</a:t>
-            </a:r>
-          </a:p>
-          <a:p>
-            <a:r>
-              <a:rPr lang="pl-PL" sz="2400" dirty="0" smtClean="0"/>
-              <a:t>Rozbudowa bazy, obrona i atak – zniszczenie wroga</a:t>
-            </a:r>
-          </a:p>
-          <a:p>
-            <a:r>
-              <a:rPr lang="pl-PL" sz="2400" dirty="0" smtClean="0"/>
-              <a:t>Jeden zasób</a:t>
-            </a:r>
-          </a:p>
-          <a:p>
-            <a:r>
-              <a:rPr lang="pl-PL" sz="2400" dirty="0" smtClean="0"/>
-              <a:t>Tylko dwóch graczy na planszy</a:t>
-            </a:r>
-          </a:p>
-          <a:p>
-            <a:r>
-              <a:rPr lang="pl-PL" sz="2400" dirty="0" smtClean="0"/>
-              <a:t>Symetryczna, płaska plansza – równe szanse</a:t>
-            </a:r>
-          </a:p>
-          <a:p>
-            <a:r>
-              <a:rPr lang="pl-PL" sz="2400" dirty="0" smtClean="0"/>
-              <a:t>Mgła wojny</a:t>
-            </a:r>
-            <a:endParaRPr lang="pl-PL" sz="2400" dirty="0"/>
-          </a:p>
-        </p:txBody>
-      </p:sp>
-    </p:spTree>
-    <p:extLst>
-      <p:ext uri="{BB962C8B-B14F-4D97-AF65-F5344CB8AC3E}">
-        <p14:creationId xmlns:p14="http://schemas.microsoft.com/office/powerpoint/2010/main" val="3016002838"/>
-      </p:ext>
-    </p:extLst>
-  </p:cSld>
-  <p:clrMapOvr>
-    <a:masterClrMapping/>
-  </p:clrMapOvr>
-  <p:timing>
-    <p:tnLst>
-      <p:par>
-        <p:cTn id="1" dur="indefinite" restart="never" nodeType="tmRoot"/>
-      </p:par>
-    </p:tnLst>
-  </p:timing>
-</p:sld>
-</file>
-
-<file path=ppt/slides/slide4.xml><?xml version="1.0" encoding="utf-8"?>
-<p:sld xmlns:a="http://schemas.openxmlformats.org/drawingml/2006/main" xmlns:r="http://schemas.openxmlformats.org/officeDocument/2006/relationships" xmlns:p="http://schemas.openxmlformats.org/presentationml/2006/main">
-  <p:cSld>
-    <p:spTree>
-      <p:nvGrpSpPr>
-        <p:cNvPr id="1" name=""/>
-        <p:cNvGrpSpPr/>
-        <p:nvPr/>
-      </p:nvGrpSpPr>
-      <p:grpSpPr>
-        <a:xfrm>
-          <a:off x="0" y="0"/>
-          <a:ext cx="0" cy="0"/>
-          <a:chOff x="0" y="0"/>
-          <a:chExt cx="0" cy="0"/>
-        </a:xfrm>
-      </p:grpSpPr>
-      <p:sp>
-        <p:nvSpPr>
-          <p:cNvPr id="2" name="Title 1"/>
-          <p:cNvSpPr>
-            <a:spLocks noGrp="1"/>
-          </p:cNvSpPr>
-          <p:nvPr>
-            <p:ph type="title"/>
-          </p:nvPr>
-        </p:nvSpPr>
-        <p:spPr>
-          <a:xfrm>
-            <a:off x="818347" y="155751"/>
-            <a:ext cx="7511473" cy="1312480"/>
-          </a:xfrm>
-        </p:spPr>
-        <p:txBody>
-          <a:bodyPr>
-            <a:normAutofit/>
-          </a:bodyPr>
-          <a:lstStyle/>
-          <a:p>
-            <a:r>
-              <a:rPr lang="pl-PL" sz="3600" dirty="0" smtClean="0"/>
-              <a:t>Sztuczna inteligencja	</a:t>
-            </a:r>
-            <a:endParaRPr lang="pl-PL" sz="3600" dirty="0"/>
-          </a:p>
-        </p:txBody>
-      </p:sp>
-      <p:sp>
-        <p:nvSpPr>
-          <p:cNvPr id="3" name="Content Placeholder 2"/>
-          <p:cNvSpPr>
-            <a:spLocks noGrp="1"/>
-          </p:cNvSpPr>
-          <p:nvPr>
-            <p:ph idx="1"/>
-          </p:nvPr>
-        </p:nvSpPr>
-        <p:spPr>
-          <a:xfrm>
-            <a:off x="425417" y="1202267"/>
-            <a:ext cx="8297332" cy="5469465"/>
-          </a:xfrm>
-        </p:spPr>
-        <p:txBody>
-          <a:bodyPr>
-            <a:normAutofit fontScale="92500" lnSpcReduction="10000"/>
-          </a:bodyPr>
-          <a:lstStyle/>
-          <a:p>
-            <a:r>
-              <a:rPr lang="pl-PL" sz="2400" dirty="0" smtClean="0"/>
-              <a:t>Zachowania ekonomiczne</a:t>
-            </a:r>
-          </a:p>
-          <a:p>
-            <a:pPr lvl="1"/>
-            <a:r>
-              <a:rPr lang="pl-PL" sz="2200" dirty="0" smtClean="0"/>
-              <a:t>Zbieranie zasobów</a:t>
-            </a:r>
-          </a:p>
-          <a:p>
-            <a:pPr lvl="1"/>
-            <a:r>
-              <a:rPr lang="pl-PL" sz="2200" dirty="0" smtClean="0"/>
-              <a:t>Wznoszenie budynków</a:t>
-            </a:r>
-          </a:p>
-          <a:p>
-            <a:pPr lvl="1"/>
-            <a:r>
-              <a:rPr lang="pl-PL" sz="2200" dirty="0" smtClean="0"/>
-              <a:t>Produkcja jednostek</a:t>
-            </a:r>
-          </a:p>
-          <a:p>
-            <a:r>
-              <a:rPr lang="pl-PL" sz="2400" dirty="0" smtClean="0"/>
-              <a:t>Zachowania taktyczne</a:t>
-            </a:r>
-          </a:p>
-          <a:p>
-            <a:pPr lvl="1"/>
-            <a:r>
-              <a:rPr lang="pl-PL" sz="2200" dirty="0" smtClean="0"/>
-              <a:t>Zwiady (informacja)</a:t>
-            </a:r>
-          </a:p>
-          <a:p>
-            <a:pPr lvl="1"/>
-            <a:r>
-              <a:rPr lang="pl-PL" sz="2200" dirty="0" smtClean="0"/>
-              <a:t>Obrona (adekwatna do sił wroga)</a:t>
-            </a:r>
-          </a:p>
-          <a:p>
-            <a:pPr lvl="1"/>
-            <a:r>
-              <a:rPr lang="pl-PL" sz="2200" dirty="0" smtClean="0"/>
-              <a:t>Przewidywanie ataków wroga</a:t>
-            </a:r>
-          </a:p>
-          <a:p>
-            <a:pPr lvl="1"/>
-            <a:r>
-              <a:rPr lang="pl-PL" sz="2200" dirty="0" smtClean="0"/>
-              <a:t>Wybieranie mniej uczęszczanych ścieżek</a:t>
-            </a:r>
-          </a:p>
-          <a:p>
-            <a:pPr lvl="1"/>
-            <a:r>
-              <a:rPr lang="pl-PL" sz="2200" dirty="0" smtClean="0"/>
-              <a:t>Synchronizacja własnych ataków</a:t>
-            </a:r>
-          </a:p>
-          <a:p>
-            <a:pPr lvl="1"/>
-            <a:r>
-              <a:rPr lang="pl-PL" sz="2200" dirty="0" smtClean="0"/>
-              <a:t>Wojna terytorialna</a:t>
-            </a:r>
-          </a:p>
-          <a:p>
-            <a:pPr lvl="1"/>
-            <a:r>
-              <a:rPr lang="pl-PL" sz="2200" dirty="0" smtClean="0"/>
-              <a:t>Zasadzki</a:t>
-            </a:r>
-          </a:p>
-          <a:p>
-            <a:pPr lvl="1"/>
-            <a:r>
-              <a:rPr lang="pl-PL" sz="2200" dirty="0" smtClean="0"/>
-              <a:t>Priorytety</a:t>
-            </a:r>
-            <a:endParaRPr lang="pl-PL" sz="2200" dirty="0"/>
-          </a:p>
-        </p:txBody>
-      </p:sp>
-    </p:spTree>
-    <p:extLst>
-      <p:ext uri="{BB962C8B-B14F-4D97-AF65-F5344CB8AC3E}">
-        <p14:creationId xmlns:p14="http://schemas.microsoft.com/office/powerpoint/2010/main" val="2343071462"/>
-      </p:ext>
-    </p:extLst>
-  </p:cSld>
-  <p:clrMapOvr>
-    <a:masterClrMapping/>
-  </p:clrMapOvr>
-  <p:timing>
-    <p:tnLst>
-      <p:par>
-        <p:cTn id="1" dur="indefinite" restart="never" nodeType="tmRoot"/>
-      </p:par>
-    </p:tnLst>
-  </p:timing>
-</p:sld>
-</file>
-
-<file path=ppt/slides/slide5.xml><?xml version="1.0" encoding="utf-8"?>
-<p:sld xmlns:a="http://schemas.openxmlformats.org/drawingml/2006/main" xmlns:r="http://schemas.openxmlformats.org/officeDocument/2006/relationships" xmlns:p="http://schemas.openxmlformats.org/presentationml/2006/main">
-  <p:cSld>
-    <p:spTree>
-      <p:nvGrpSpPr>
-        <p:cNvPr id="1" name=""/>
-        <p:cNvGrpSpPr/>
-        <p:nvPr/>
-      </p:nvGrpSpPr>
-      <p:grpSpPr>
-        <a:xfrm>
-          <a:off x="0" y="0"/>
-          <a:ext cx="0" cy="0"/>
-          <a:chOff x="0" y="0"/>
-          <a:chExt cx="0" cy="0"/>
-        </a:xfrm>
-      </p:grpSpPr>
-      <p:sp>
-        <p:nvSpPr>
-          <p:cNvPr id="2" name="Title 1"/>
-          <p:cNvSpPr>
-            <a:spLocks noGrp="1"/>
-          </p:cNvSpPr>
-          <p:nvPr>
-            <p:ph type="title"/>
-          </p:nvPr>
-        </p:nvSpPr>
-        <p:spPr/>
-        <p:txBody>
-          <a:bodyPr>
-            <a:normAutofit/>
-          </a:bodyPr>
-          <a:lstStyle/>
-          <a:p>
-            <a:r>
-              <a:rPr lang="pl-PL" sz="3600" dirty="0" smtClean="0"/>
-              <a:t>Sztuczna inteligencja</a:t>
-            </a:r>
-            <a:endParaRPr lang="pl-PL" sz="3600" dirty="0"/>
-          </a:p>
-        </p:txBody>
-      </p:sp>
-      <p:sp>
-        <p:nvSpPr>
-          <p:cNvPr id="3" name="Content Placeholder 2"/>
-          <p:cNvSpPr>
-            <a:spLocks noGrp="1"/>
-          </p:cNvSpPr>
-          <p:nvPr>
-            <p:ph idx="1"/>
-          </p:nvPr>
-        </p:nvSpPr>
-        <p:spPr>
-          <a:xfrm>
-            <a:off x="425417" y="1890756"/>
-            <a:ext cx="8297332" cy="4041162"/>
-          </a:xfrm>
-        </p:spPr>
-        <p:txBody>
-          <a:bodyPr>
-            <a:normAutofit/>
-          </a:bodyPr>
-          <a:lstStyle/>
-          <a:p>
-            <a:r>
-              <a:rPr lang="pl-PL" sz="2400" dirty="0" smtClean="0"/>
-              <a:t>Środki do osiągnięcia celów</a:t>
-            </a:r>
-          </a:p>
-          <a:p>
-            <a:pPr lvl="1"/>
-            <a:r>
-              <a:rPr lang="pl-PL" sz="2200" dirty="0" smtClean="0"/>
-              <a:t>Baza wiedzy (np. pola potencjałów)</a:t>
-            </a:r>
-          </a:p>
-          <a:p>
-            <a:pPr lvl="1"/>
-            <a:r>
-              <a:rPr lang="pl-PL" sz="2200" dirty="0" smtClean="0"/>
-              <a:t>Maszyny stanów</a:t>
-            </a:r>
-          </a:p>
-          <a:p>
-            <a:pPr lvl="1"/>
-            <a:r>
-              <a:rPr lang="pl-PL" sz="2200" dirty="0" smtClean="0"/>
-              <a:t>Heurystyki</a:t>
-            </a:r>
-          </a:p>
-          <a:p>
-            <a:r>
-              <a:rPr lang="pl-PL" sz="2800" dirty="0" smtClean="0"/>
-              <a:t>Nie robimy </a:t>
-            </a:r>
-            <a:r>
-              <a:rPr lang="pl-PL" sz="2800" dirty="0" smtClean="0"/>
-              <a:t>uczącego </a:t>
-            </a:r>
-            <a:r>
-              <a:rPr lang="pl-PL" sz="2800" dirty="0" smtClean="0"/>
-              <a:t>się AI</a:t>
-            </a:r>
-            <a:endParaRPr lang="pl-PL" sz="2800" dirty="0"/>
-          </a:p>
-        </p:txBody>
-      </p:sp>
-    </p:spTree>
-    <p:extLst>
-      <p:ext uri="{BB962C8B-B14F-4D97-AF65-F5344CB8AC3E}">
-        <p14:creationId xmlns:p14="http://schemas.microsoft.com/office/powerpoint/2010/main" val="2342022908"/>
-      </p:ext>
-    </p:extLst>
-  </p:cSld>
-  <p:clrMapOvr>
-    <a:masterClrMapping/>
-  </p:clrMapOvr>
-  <p:timing>
-    <p:tnLst>
-      <p:par>
-        <p:cTn id="1" dur="indefinite" restart="never" nodeType="tmRoot"/>
-      </p:par>
-    </p:tnLst>
-  </p:timing>
-</p:sld>
-</file>
-
-<file path=ppt/slides/slide6.xml><?xml version="1.0" encoding="utf-8"?>
-<p:sld xmlns:a="http://schemas.openxmlformats.org/drawingml/2006/main" xmlns:r="http://schemas.openxmlformats.org/officeDocument/2006/relationships" xmlns:p="http://schemas.openxmlformats.org/presentationml/2006/main">
-  <p:cSld>
-    <p:spTree>
-      <p:nvGrpSpPr>
-        <p:cNvPr id="1" name=""/>
-        <p:cNvGrpSpPr/>
-        <p:nvPr/>
-      </p:nvGrpSpPr>
-      <p:grpSpPr>
-        <a:xfrm>
-          <a:off x="0" y="0"/>
-          <a:ext cx="0" cy="0"/>
-          <a:chOff x="0" y="0"/>
-          <a:chExt cx="0" cy="0"/>
-        </a:xfrm>
-      </p:grpSpPr>
-      <p:sp>
-        <p:nvSpPr>
-          <p:cNvPr id="2" name="Title 1"/>
-          <p:cNvSpPr>
-            <a:spLocks noGrp="1"/>
-          </p:cNvSpPr>
-          <p:nvPr>
-            <p:ph type="title"/>
-          </p:nvPr>
-        </p:nvSpPr>
-        <p:spPr/>
-        <p:txBody>
-          <a:bodyPr>
-            <a:normAutofit/>
-          </a:bodyPr>
-          <a:lstStyle/>
-          <a:p>
-            <a:r>
-              <a:rPr lang="pl-PL" sz="3600" dirty="0" smtClean="0"/>
-              <a:t>Badania skuteczności</a:t>
-            </a:r>
-            <a:endParaRPr lang="pl-PL" sz="3600" dirty="0"/>
-          </a:p>
-        </p:txBody>
-      </p:sp>
-      <p:sp>
-        <p:nvSpPr>
-          <p:cNvPr id="3" name="Content Placeholder 2"/>
-          <p:cNvSpPr>
-            <a:spLocks noGrp="1"/>
-          </p:cNvSpPr>
-          <p:nvPr>
-            <p:ph idx="1"/>
-          </p:nvPr>
-        </p:nvSpPr>
-        <p:spPr>
-          <a:xfrm>
-            <a:off x="425417" y="1890756"/>
-            <a:ext cx="8297332" cy="4041162"/>
-          </a:xfrm>
-        </p:spPr>
-        <p:txBody>
-          <a:bodyPr>
-            <a:normAutofit/>
-          </a:bodyPr>
-          <a:lstStyle/>
-          <a:p>
-            <a:r>
-              <a:rPr lang="pl-PL" sz="2800" dirty="0" smtClean="0"/>
-              <a:t>AI z włączanymi/wyłączanymi zachowaniami</a:t>
-            </a:r>
-          </a:p>
-          <a:p>
-            <a:r>
-              <a:rPr lang="pl-PL" sz="2800" dirty="0" smtClean="0"/>
-              <a:t>Ustawić różnie skonfigurowane AI na arenie przeciwko sobie</a:t>
-            </a:r>
-          </a:p>
-          <a:p>
-            <a:r>
-              <a:rPr lang="pl-PL" sz="2800" dirty="0" smtClean="0"/>
-              <a:t>Wnioski na podstawie obserwacji przebiegu rozgrywki</a:t>
-            </a:r>
-          </a:p>
-          <a:p>
-            <a:r>
-              <a:rPr lang="pl-PL" sz="2800" dirty="0" smtClean="0"/>
-              <a:t>OPCJONALNIE: ankiety, badania na ludziach </a:t>
-            </a:r>
-            <a:r>
-              <a:rPr lang="pl-PL" sz="2800" dirty="0" smtClean="0">
-                <a:sym typeface="Wingdings" panose="05000000000000000000" pitchFamily="2" charset="2"/>
-              </a:rPr>
-              <a:t></a:t>
-            </a:r>
-            <a:endParaRPr lang="pl-PL" sz="2800" dirty="0"/>
-          </a:p>
-        </p:txBody>
-      </p:sp>
-    </p:spTree>
-    <p:extLst>
-      <p:ext uri="{BB962C8B-B14F-4D97-AF65-F5344CB8AC3E}">
-        <p14:creationId xmlns:p14="http://schemas.microsoft.com/office/powerpoint/2010/main" val="2028217685"/>
-      </p:ext>
-    </p:extLst>
-  </p:cSld>
-  <p:clrMapOvr>
-    <a:masterClrMapping/>
-  </p:clrMapOvr>
-  <p:timing>
-    <p:tnLst>
-      <p:par>
-        <p:cTn id="1" dur="indefinite" restart="never" nodeType="tmRoot"/>
-      </p:par>
-    </p:tnLst>
-  </p:timing>
-</p:sld>
-</file>
-
-<file path=ppt/slides/slide7.xml><?xml version="1.0" encoding="utf-8"?>
-<p:sld xmlns:a="http://schemas.openxmlformats.org/drawingml/2006/main" xmlns:r="http://schemas.openxmlformats.org/officeDocument/2006/relationships" xmlns:p="http://schemas.openxmlformats.org/presentationml/2006/main">
-  <p:cSld>
-    <p:spTree>
-      <p:nvGrpSpPr>
-        <p:cNvPr id="1" name=""/>
-        <p:cNvGrpSpPr/>
-        <p:nvPr/>
-      </p:nvGrpSpPr>
-      <p:grpSpPr>
-        <a:xfrm>
-          <a:off x="0" y="0"/>
-          <a:ext cx="0" cy="0"/>
-          <a:chOff x="0" y="0"/>
-          <a:chExt cx="0" cy="0"/>
-        </a:xfrm>
-      </p:grpSpPr>
-      <p:sp>
-        <p:nvSpPr>
           <p:cNvPr id="4" name="Title 3"/>
           <p:cNvSpPr>
             <a:spLocks noGrp="1"/>
@@ -7494,7 +7020,7 @@
 </p:sld>
 </file>
 
-<file path=ppt/slides/slide8.xml><?xml version="1.0" encoding="utf-8"?>
+<file path=ppt/slides/slide4.xml><?xml version="1.0" encoding="utf-8"?>
 <p:sld xmlns:a="http://schemas.openxmlformats.org/drawingml/2006/main" xmlns:r="http://schemas.openxmlformats.org/officeDocument/2006/relationships" xmlns:p="http://schemas.openxmlformats.org/presentationml/2006/main">
   <p:cSld>
     <p:spTree>
@@ -7714,7 +7240,7 @@
         </p:spPr>
         <p:txBody>
           <a:bodyPr vert="horz" lIns="91440" tIns="45720" rIns="91440" bIns="45720" rtlCol="0" anchor="t">
-            <a:normAutofit lnSpcReduction="10000"/>
+            <a:normAutofit/>
           </a:bodyPr>
           <a:lstStyle>
             <a:lvl1pPr marL="285750" indent="-285750" algn="l" defTabSz="457200" rtl="0" eaLnBrk="1" latinLnBrk="0" hangingPunct="1">
@@ -8143,7 +7669,7 @@
           </a:lstStyle>
           <a:p>
             <a:r>
-              <a:rPr lang="pl-PL" smtClean="0"/>
+              <a:rPr lang="pl-PL" dirty="0" smtClean="0"/>
               <a:t>Wartość </a:t>
             </a:r>
             <a:r>
@@ -8167,12 +7693,6 @@
             <a:r>
               <a:rPr lang="pl-PL" dirty="0" smtClean="0"/>
               <a:t>Modele jednostek [czołg &amp; Wyrzutnia Rakiet]</a:t>
-            </a:r>
-          </a:p>
-          <a:p>
-            <a:r>
-              <a:rPr lang="pl-PL" dirty="0" smtClean="0"/>
-              <a:t>Modele Budynków [Laboratorium &amp; Const Yard]</a:t>
             </a:r>
           </a:p>
           <a:p>
@@ -8236,7 +7756,7 @@
 </p:sld>
 </file>
 
-<file path=ppt/slides/slide9.xml><?xml version="1.0" encoding="utf-8"?>
+<file path=ppt/slides/slide5.xml><?xml version="1.0" encoding="utf-8"?>
 <p:sld xmlns:a="http://schemas.openxmlformats.org/drawingml/2006/main" xmlns:r="http://schemas.openxmlformats.org/officeDocument/2006/relationships" xmlns:p="http://schemas.openxmlformats.org/presentationml/2006/main">
   <p:cSld>
     <p:spTree>
@@ -8823,7 +8343,7 @@
   <a:extraClrSchemeLst/>
   <a:extLst>
     <a:ext uri="{05A4C25C-085E-4340-85A3-A5531E510DB2}">
-      <thm15:themeFamily xmlns:thm15="http://schemas.microsoft.com/office/thememl/2012/main" xmlns="" name="Mesh" id="{789EC3FE-34FD-429C-9918-760025E6C145}" vid="{B8BE45C0-8141-4D58-8C71-A009BC26FBBB}"/>
+      <thm15:themeFamily xmlns="" xmlns:thm15="http://schemas.microsoft.com/office/thememl/2012/main" name="Mesh" id="{789EC3FE-34FD-429C-9918-760025E6C145}" vid="{B8BE45C0-8141-4D58-8C71-A009BC26FBBB}"/>
     </a:ext>
   </a:extLst>
 </a:theme>
@@ -9084,7 +8604,7 @@
   <a:extraClrSchemeLst/>
   <a:extLst>
     <a:ext uri="{05A4C25C-085E-4340-85A3-A5531E510DB2}">
-      <thm15:themeFamily xmlns:thm15="http://schemas.microsoft.com/office/thememl/2012/main" xmlns="" name="Office Theme" id="{62F939B6-93AF-4DB8-9C6B-D6C7DFDC589F}" vid="{4A3C46E8-61CC-4603-A589-7422A47A8E4A}"/>
+      <thm15:themeFamily xmlns="" xmlns:thm15="http://schemas.microsoft.com/office/thememl/2012/main" name="Office Theme" id="{62F939B6-93AF-4DB8-9C6B-D6C7DFDC589F}" vid="{4A3C46E8-61CC-4603-A589-7422A47A8E4A}"/>
     </a:ext>
   </a:extLst>
 </a:theme>

</xml_diff>

<commit_message>
Rocket Launcher + Tank + poprawka w prezentacji
</commit_message>
<xml_diff>
--- a/Semi/3. Epilog/Epilog.pptx
+++ b/Semi/3. Epilog/Epilog.pptx
@@ -6822,26 +6822,13 @@
           <a:p>
             <a:r>
               <a:rPr lang="pl-PL" sz="2400" dirty="0" smtClean="0"/>
-              <a:t>Prototyp gry </a:t>
-            </a:r>
+              <a:t>Prototyp gry RTS oparty o nieskomplikowane reguły</a:t>
+            </a:r>
+          </a:p>
+          <a:p>
             <a:r>
               <a:rPr lang="pl-PL" sz="2400" dirty="0" smtClean="0"/>
-              <a:t>RTS oparty o nieskomplikowane reguły</a:t>
-            </a:r>
-            <a:endParaRPr lang="pl-PL" sz="2400" dirty="0" smtClean="0"/>
-          </a:p>
-          <a:p>
-            <a:r>
-              <a:rPr lang="pl-PL" sz="2400" dirty="0" smtClean="0"/>
-              <a:t>Sztuczna </a:t>
-            </a:r>
-            <a:r>
-              <a:rPr lang="pl-PL" sz="2400" dirty="0" smtClean="0"/>
-              <a:t>inteligencja dla </a:t>
-            </a:r>
-            <a:r>
-              <a:rPr lang="pl-PL" sz="2400" dirty="0" smtClean="0"/>
-              <a:t>przeciwnika</a:t>
+              <a:t>Sztuczna inteligencja dla przeciwnika</a:t>
             </a:r>
           </a:p>
           <a:p>
@@ -6873,15 +6860,7 @@
           <a:p>
             <a:r>
               <a:rPr lang="pl-PL" sz="2400" dirty="0" smtClean="0"/>
-              <a:t>Testowanie </a:t>
-            </a:r>
-            <a:r>
-              <a:rPr lang="pl-PL" sz="2400" dirty="0" smtClean="0"/>
-              <a:t>skuteczności sztucznej </a:t>
-            </a:r>
-            <a:r>
-              <a:rPr lang="pl-PL" sz="2400" dirty="0" smtClean="0"/>
-              <a:t>inteligencji</a:t>
+              <a:t>Testowanie skuteczności sztucznej inteligencji</a:t>
             </a:r>
           </a:p>
           <a:p>
@@ -7232,7 +7211,7 @@
         <p:spPr>
           <a:xfrm>
             <a:off x="4029633" y="1861457"/>
-            <a:ext cx="4853109" cy="4789714"/>
+            <a:ext cx="4853109" cy="3418114"/>
           </a:xfrm>
           <a:prstGeom prst="rect">
             <a:avLst/>
@@ -7680,8 +7659,17 @@
           <a:p>
             <a:r>
               <a:rPr lang="pl-PL" dirty="0"/>
-              <a:t>Level Design</a:t>
-            </a:r>
+              <a:t>Level </a:t>
+            </a:r>
+            <a:r>
+              <a:rPr lang="pl-PL" dirty="0"/>
+              <a:t>Design [Modele </a:t>
+            </a:r>
+            <a:r>
+              <a:rPr lang="pl-PL" dirty="0" smtClean="0"/>
+              <a:t>Przeszkód]</a:t>
+            </a:r>
+            <a:endParaRPr lang="pl-PL" dirty="0"/>
           </a:p>
           <a:p>
             <a:r>
@@ -7692,23 +7680,11 @@
           <a:p>
             <a:r>
               <a:rPr lang="pl-PL" dirty="0" smtClean="0"/>
-              <a:t>Modele jednostek [czołg &amp; Wyrzutnia Rakiet]</a:t>
-            </a:r>
-          </a:p>
-          <a:p>
-            <a:r>
-              <a:rPr lang="pl-PL" dirty="0" smtClean="0"/>
-              <a:t>Modele </a:t>
+              <a:t>Tło </a:t>
             </a:r>
             <a:r>
               <a:rPr lang="pl-PL" dirty="0"/>
-              <a:t>Przeszkód</a:t>
-            </a:r>
-          </a:p>
-          <a:p>
-            <a:r>
-              <a:rPr lang="pl-PL" dirty="0"/>
-              <a:t>Tło Głównego Menu</a:t>
+              <a:t>Głównego Menu</a:t>
             </a:r>
           </a:p>
           <a:p>
@@ -8343,7 +8319,7 @@
   <a:extraClrSchemeLst/>
   <a:extLst>
     <a:ext uri="{05A4C25C-085E-4340-85A3-A5531E510DB2}">
-      <thm15:themeFamily xmlns="" xmlns:thm15="http://schemas.microsoft.com/office/thememl/2012/main" name="Mesh" id="{789EC3FE-34FD-429C-9918-760025E6C145}" vid="{B8BE45C0-8141-4D58-8C71-A009BC26FBBB}"/>
+      <thm15:themeFamily xmlns:thm15="http://schemas.microsoft.com/office/thememl/2012/main" xmlns="" name="Mesh" id="{789EC3FE-34FD-429C-9918-760025E6C145}" vid="{B8BE45C0-8141-4D58-8C71-A009BC26FBBB}"/>
     </a:ext>
   </a:extLst>
 </a:theme>
@@ -8604,7 +8580,7 @@
   <a:extraClrSchemeLst/>
   <a:extLst>
     <a:ext uri="{05A4C25C-085E-4340-85A3-A5531E510DB2}">
-      <thm15:themeFamily xmlns="" xmlns:thm15="http://schemas.microsoft.com/office/thememl/2012/main" name="Office Theme" id="{62F939B6-93AF-4DB8-9C6B-D6C7DFDC589F}" vid="{4A3C46E8-61CC-4603-A589-7422A47A8E4A}"/>
+      <thm15:themeFamily xmlns:thm15="http://schemas.microsoft.com/office/thememl/2012/main" xmlns="" name="Office Theme" id="{62F939B6-93AF-4DB8-9C6B-D6C7DFDC589F}" vid="{4A3C46E8-61CC-4603-A589-7422A47A8E4A}"/>
     </a:ext>
   </a:extLst>
 </a:theme>

</xml_diff>